<commit_message>
Slides SOP & MVC II
</commit_message>
<xml_diff>
--- a/Slides/Servicios_MVC/Introduccion-al-Proyecto-Aplicacion-Web-ASPNET-Core-MVC.pptx
+++ b/Slides/Servicios_MVC/Introduccion-al-Proyecto-Aplicacion-Web-ASPNET-Core-MVC.pptx
@@ -5,7 +5,7 @@
     <p:sldMasterId id="2147483648" r:id="rId1"/>
   </p:sldMasterIdLst>
   <p:notesMasterIdLst>
-    <p:notesMasterId r:id="rId11"/>
+    <p:notesMasterId r:id="rId12"/>
   </p:notesMasterIdLst>
   <p:sldIdLst>
     <p:sldId id="256" r:id="rId2"/>
@@ -16,17 +16,18 @@
     <p:sldId id="265" r:id="rId7"/>
     <p:sldId id="259" r:id="rId8"/>
     <p:sldId id="261" r:id="rId9"/>
-    <p:sldId id="262" r:id="rId10"/>
+    <p:sldId id="266" r:id="rId10"/>
+    <p:sldId id="262" r:id="rId11"/>
   </p:sldIdLst>
   <p:sldSz cx="14630400" cy="8229600"/>
   <p:notesSz cx="8229600" cy="14630400"/>
   <p:embeddedFontLst>
     <p:embeddedFont>
       <p:font typeface="Calibri" panose="020F0502020204030204" pitchFamily="34" charset="0"/>
-      <p:regular r:id="rId12"/>
-      <p:bold r:id="rId13"/>
-      <p:italic r:id="rId14"/>
-      <p:boldItalic r:id="rId15"/>
+      <p:regular r:id="rId13"/>
+      <p:bold r:id="rId14"/>
+      <p:italic r:id="rId15"/>
+      <p:boldItalic r:id="rId16"/>
     </p:embeddedFont>
   </p:embeddedFontLst>
   <p:defaultTextStyle>
@@ -136,8 +137,8 @@
 <pc:chgInfo xmlns:a="http://schemas.openxmlformats.org/drawingml/2006/main" xmlns:r="http://schemas.openxmlformats.org/officeDocument/2006/relationships" xmlns:ac="http://schemas.microsoft.com/office/drawing/2013/main/command" xmlns:pc="http://schemas.microsoft.com/office/powerpoint/2013/main/command">
   <pc:docChgLst>
     <pc:chgData name="Cesar Augusto Lopez Gallego" userId="0dfa9112-9251-4882-b472-cf2dfcee09d1" providerId="ADAL" clId="{41755787-3FDC-4F3A-8F2C-948C2EE791E5}"/>
-    <pc:docChg chg="custSel addSld delSld modSld sldOrd">
-      <pc:chgData name="Cesar Augusto Lopez Gallego" userId="0dfa9112-9251-4882-b472-cf2dfcee09d1" providerId="ADAL" clId="{41755787-3FDC-4F3A-8F2C-948C2EE791E5}" dt="2025-04-24T00:02:00.153" v="361"/>
+    <pc:docChg chg="undo custSel addSld delSld modSld sldOrd">
+      <pc:chgData name="Cesar Augusto Lopez Gallego" userId="0dfa9112-9251-4882-b472-cf2dfcee09d1" providerId="ADAL" clId="{41755787-3FDC-4F3A-8F2C-948C2EE791E5}" dt="2025-04-24T12:45:34.630" v="638" actId="478"/>
       <pc:docMkLst>
         <pc:docMk/>
       </pc:docMkLst>
@@ -591,8 +592,8 @@
           </ac:spMkLst>
         </pc:spChg>
       </pc:sldChg>
-      <pc:sldChg chg="modSp mod">
-        <pc:chgData name="Cesar Augusto Lopez Gallego" userId="0dfa9112-9251-4882-b472-cf2dfcee09d1" providerId="ADAL" clId="{41755787-3FDC-4F3A-8F2C-948C2EE791E5}" dt="2025-04-23T23:05:05.076" v="15" actId="2711"/>
+      <pc:sldChg chg="delSp modSp mod">
+        <pc:chgData name="Cesar Augusto Lopez Gallego" userId="0dfa9112-9251-4882-b472-cf2dfcee09d1" providerId="ADAL" clId="{41755787-3FDC-4F3A-8F2C-948C2EE791E5}" dt="2025-04-24T12:45:34.630" v="638" actId="478"/>
         <pc:sldMkLst>
           <pc:docMk/>
           <pc:sldMk cId="0" sldId="262"/>
@@ -614,7 +615,7 @@
           </ac:spMkLst>
         </pc:spChg>
         <pc:spChg chg="mod">
-          <ac:chgData name="Cesar Augusto Lopez Gallego" userId="0dfa9112-9251-4882-b472-cf2dfcee09d1" providerId="ADAL" clId="{41755787-3FDC-4F3A-8F2C-948C2EE791E5}" dt="2025-04-23T23:05:05.076" v="15" actId="2711"/>
+          <ac:chgData name="Cesar Augusto Lopez Gallego" userId="0dfa9112-9251-4882-b472-cf2dfcee09d1" providerId="ADAL" clId="{41755787-3FDC-4F3A-8F2C-948C2EE791E5}" dt="2025-04-24T12:45:25.626" v="637" actId="20577"/>
           <ac:spMkLst>
             <pc:docMk/>
             <pc:sldMk cId="0" sldId="262"/>
@@ -653,8 +654,8 @@
             <ac:spMk id="11" creationId="{00000000-0000-0000-0000-000000000000}"/>
           </ac:spMkLst>
         </pc:spChg>
-        <pc:spChg chg="mod">
-          <ac:chgData name="Cesar Augusto Lopez Gallego" userId="0dfa9112-9251-4882-b472-cf2dfcee09d1" providerId="ADAL" clId="{41755787-3FDC-4F3A-8F2C-948C2EE791E5}" dt="2025-04-23T23:05:05.076" v="15" actId="2711"/>
+        <pc:spChg chg="del mod">
+          <ac:chgData name="Cesar Augusto Lopez Gallego" userId="0dfa9112-9251-4882-b472-cf2dfcee09d1" providerId="ADAL" clId="{41755787-3FDC-4F3A-8F2C-948C2EE791E5}" dt="2025-04-24T12:45:34.630" v="638" actId="478"/>
           <ac:spMkLst>
             <pc:docMk/>
             <pc:sldMk cId="0" sldId="262"/>
@@ -666,7 +667,7 @@
         <pc:chgData name="Cesar Augusto Lopez Gallego" userId="0dfa9112-9251-4882-b472-cf2dfcee09d1" providerId="ADAL" clId="{41755787-3FDC-4F3A-8F2C-948C2EE791E5}" dt="2025-04-23T23:05:10.369" v="16" actId="47"/>
         <pc:sldMkLst>
           <pc:docMk/>
-          <pc:sldMk cId="0" sldId="263"/>
+          <pc:sldMk cId="1128009416" sldId="263"/>
         </pc:sldMkLst>
       </pc:sldChg>
       <pc:sldChg chg="addSp delSp modSp new mod">
@@ -839,6 +840,85 @@
             <pc:docMk/>
             <pc:sldMk cId="4257895227" sldId="265"/>
             <ac:graphicFrameMk id="3" creationId="{EF5767B5-A829-4290-82CD-66D67FB69AEC}"/>
+          </ac:graphicFrameMkLst>
+        </pc:graphicFrameChg>
+      </pc:sldChg>
+      <pc:sldChg chg="addSp delSp modSp new mod">
+        <pc:chgData name="Cesar Augusto Lopez Gallego" userId="0dfa9112-9251-4882-b472-cf2dfcee09d1" providerId="ADAL" clId="{41755787-3FDC-4F3A-8F2C-948C2EE791E5}" dt="2025-04-24T12:44:45.293" v="620" actId="20577"/>
+        <pc:sldMkLst>
+          <pc:docMk/>
+          <pc:sldMk cId="3976031665" sldId="266"/>
+        </pc:sldMkLst>
+        <pc:spChg chg="add mod">
+          <ac:chgData name="Cesar Augusto Lopez Gallego" userId="0dfa9112-9251-4882-b472-cf2dfcee09d1" providerId="ADAL" clId="{41755787-3FDC-4F3A-8F2C-948C2EE791E5}" dt="2025-04-24T12:40:28.706" v="385" actId="20577"/>
+          <ac:spMkLst>
+            <pc:docMk/>
+            <pc:sldMk cId="3976031665" sldId="266"/>
+            <ac:spMk id="2" creationId="{2FF6A837-8A35-4402-9FF3-8FC6EA0AFC0C}"/>
+          </ac:spMkLst>
+        </pc:spChg>
+        <pc:spChg chg="add mod">
+          <ac:chgData name="Cesar Augusto Lopez Gallego" userId="0dfa9112-9251-4882-b472-cf2dfcee09d1" providerId="ADAL" clId="{41755787-3FDC-4F3A-8F2C-948C2EE791E5}" dt="2025-04-24T12:44:45.293" v="620" actId="20577"/>
+          <ac:spMkLst>
+            <pc:docMk/>
+            <pc:sldMk cId="3976031665" sldId="266"/>
+            <ac:spMk id="4" creationId="{B297E61B-B5B7-4612-A19D-FBE47BD9A202}"/>
+          </ac:spMkLst>
+        </pc:spChg>
+        <pc:spChg chg="add del">
+          <ac:chgData name="Cesar Augusto Lopez Gallego" userId="0dfa9112-9251-4882-b472-cf2dfcee09d1" providerId="ADAL" clId="{41755787-3FDC-4F3A-8F2C-948C2EE791E5}" dt="2025-04-24T12:42:00.621" v="440" actId="478"/>
+          <ac:spMkLst>
+            <pc:docMk/>
+            <pc:sldMk cId="3976031665" sldId="266"/>
+            <ac:spMk id="5" creationId="{FB95C171-7D24-437E-8DAD-43DE81F672A7}"/>
+          </ac:spMkLst>
+        </pc:spChg>
+        <pc:graphicFrameChg chg="add del mod">
+          <ac:chgData name="Cesar Augusto Lopez Gallego" userId="0dfa9112-9251-4882-b472-cf2dfcee09d1" providerId="ADAL" clId="{41755787-3FDC-4F3A-8F2C-948C2EE791E5}" dt="2025-04-24T12:43:16.180" v="507"/>
+          <ac:graphicFrameMkLst>
+            <pc:docMk/>
+            <pc:sldMk cId="3976031665" sldId="266"/>
+            <ac:graphicFrameMk id="6" creationId="{091FD9AE-7D97-4806-AB6A-C42F20434C24}"/>
+          </ac:graphicFrameMkLst>
+        </pc:graphicFrameChg>
+        <pc:graphicFrameChg chg="add del mod">
+          <ac:chgData name="Cesar Augusto Lopez Gallego" userId="0dfa9112-9251-4882-b472-cf2dfcee09d1" providerId="ADAL" clId="{41755787-3FDC-4F3A-8F2C-948C2EE791E5}" dt="2025-04-24T12:43:16.180" v="507"/>
+          <ac:graphicFrameMkLst>
+            <pc:docMk/>
+            <pc:sldMk cId="3976031665" sldId="266"/>
+            <ac:graphicFrameMk id="7" creationId="{86537A92-BF91-4128-BA96-38BA9336F3C9}"/>
+          </ac:graphicFrameMkLst>
+        </pc:graphicFrameChg>
+        <pc:graphicFrameChg chg="add del mod">
+          <ac:chgData name="Cesar Augusto Lopez Gallego" userId="0dfa9112-9251-4882-b472-cf2dfcee09d1" providerId="ADAL" clId="{41755787-3FDC-4F3A-8F2C-948C2EE791E5}" dt="2025-04-24T12:43:16.180" v="507"/>
+          <ac:graphicFrameMkLst>
+            <pc:docMk/>
+            <pc:sldMk cId="3976031665" sldId="266"/>
+            <ac:graphicFrameMk id="8" creationId="{DA9050AA-1785-487F-8AB9-F1C58FF8AC6C}"/>
+          </ac:graphicFrameMkLst>
+        </pc:graphicFrameChg>
+        <pc:graphicFrameChg chg="add del mod">
+          <ac:chgData name="Cesar Augusto Lopez Gallego" userId="0dfa9112-9251-4882-b472-cf2dfcee09d1" providerId="ADAL" clId="{41755787-3FDC-4F3A-8F2C-948C2EE791E5}" dt="2025-04-24T12:43:32.088" v="511" actId="478"/>
+          <ac:graphicFrameMkLst>
+            <pc:docMk/>
+            <pc:sldMk cId="3976031665" sldId="266"/>
+            <ac:graphicFrameMk id="9" creationId="{4166980F-F2E4-445B-9338-74985B459A3F}"/>
+          </ac:graphicFrameMkLst>
+        </pc:graphicFrameChg>
+        <pc:graphicFrameChg chg="add del mod modGraphic">
+          <ac:chgData name="Cesar Augusto Lopez Gallego" userId="0dfa9112-9251-4882-b472-cf2dfcee09d1" providerId="ADAL" clId="{41755787-3FDC-4F3A-8F2C-948C2EE791E5}" dt="2025-04-24T12:43:32.088" v="511" actId="478"/>
+          <ac:graphicFrameMkLst>
+            <pc:docMk/>
+            <pc:sldMk cId="3976031665" sldId="266"/>
+            <ac:graphicFrameMk id="10" creationId="{1920CB2C-2771-427A-BCE6-368AE0B3309B}"/>
+          </ac:graphicFrameMkLst>
+        </pc:graphicFrameChg>
+        <pc:graphicFrameChg chg="add del mod">
+          <ac:chgData name="Cesar Augusto Lopez Gallego" userId="0dfa9112-9251-4882-b472-cf2dfcee09d1" providerId="ADAL" clId="{41755787-3FDC-4F3A-8F2C-948C2EE791E5}" dt="2025-04-24T12:43:32.088" v="511" actId="478"/>
+          <ac:graphicFrameMkLst>
+            <pc:docMk/>
+            <pc:sldMk cId="3976031665" sldId="266"/>
+            <ac:graphicFrameMk id="11" creationId="{0929A15B-3D48-4C56-8BD4-B4F1F77D731C}"/>
           </ac:graphicFrameMkLst>
         </pc:graphicFrameChg>
       </pc:sldChg>
@@ -5068,7 +5148,7 @@
           <a:p>
             <a:fld id="{F7021451-1387-4CA6-816F-3879F97B5CBC}" type="slidenum">
               <a:rPr lang="en-US"/>
-              <a:t>9</a:t>
+              <a:t>10</a:t>
             </a:fld>
             <a:endParaRPr lang="en-US"/>
           </a:p>
@@ -6132,6 +6212,440 @@
               <a:t>por Cesar Lopez</a:t>
             </a:r>
             <a:endParaRPr lang="en-US" sz="2100" dirty="0">
+              <a:latin typeface="Times New Roman" panose="02020603050405020304" pitchFamily="18" charset="0"/>
+              <a:cs typeface="Times New Roman" panose="02020603050405020304" pitchFamily="18" charset="0"/>
+            </a:endParaRPr>
+          </a:p>
+        </p:txBody>
+      </p:sp>
+    </p:spTree>
+  </p:cSld>
+  <p:clrMapOvr>
+    <a:masterClrMapping/>
+  </p:clrMapOvr>
+</p:sld>
+</file>
+
+<file path=ppt/slides/slide10.xml><?xml version="1.0" encoding="utf-8"?>
+<p:sld xmlns:a="http://schemas.openxmlformats.org/drawingml/2006/main" xmlns:r="http://schemas.openxmlformats.org/officeDocument/2006/relationships" xmlns:p="http://schemas.openxmlformats.org/presentationml/2006/main">
+  <p:cSld name="Slide 7">
+    <p:spTree>
+      <p:nvGrpSpPr>
+        <p:cNvPr id="1" name=""/>
+        <p:cNvGrpSpPr/>
+        <p:nvPr/>
+      </p:nvGrpSpPr>
+      <p:grpSpPr>
+        <a:xfrm>
+          <a:off x="0" y="0"/>
+          <a:ext cx="0" cy="0"/>
+          <a:chOff x="0" y="0"/>
+          <a:chExt cx="0" cy="0"/>
+        </a:xfrm>
+      </p:grpSpPr>
+      <p:sp>
+        <p:nvSpPr>
+          <p:cNvPr id="2" name="Text 0"/>
+          <p:cNvSpPr/>
+          <p:nvPr/>
+        </p:nvSpPr>
+        <p:spPr>
+          <a:xfrm>
+            <a:off x="745569" y="756285"/>
+            <a:ext cx="11277243" cy="665678"/>
+          </a:xfrm>
+          <a:prstGeom prst="rect">
+            <a:avLst/>
+          </a:prstGeom>
+          <a:noFill/>
+          <a:ln/>
+        </p:spPr>
+        <p:txBody>
+          <a:bodyPr wrap="none" lIns="0" tIns="0" rIns="0" bIns="0" rtlCol="0" anchor="t"/>
+          <a:lstStyle/>
+          <a:p>
+            <a:pPr marL="0" indent="0" algn="l">
+              <a:lnSpc>
+                <a:spcPts val="5200"/>
+              </a:lnSpc>
+              <a:buNone/>
+            </a:pPr>
+            <a:r>
+              <a:rPr lang="en-US" sz="4150" b="1" dirty="0">
+                <a:solidFill>
+                  <a:srgbClr val="233939"/>
+                </a:solidFill>
+                <a:latin typeface="Times New Roman" panose="02020603050405020304" pitchFamily="18" charset="0"/>
+                <a:ea typeface="Syne Bold" pitchFamily="34" charset="-122"/>
+                <a:cs typeface="Times New Roman" panose="02020603050405020304" pitchFamily="18" charset="0"/>
+              </a:rPr>
+              <a:t>Ventajas del Enfoque Modular de MVC</a:t>
+            </a:r>
+            <a:endParaRPr lang="en-US" sz="4150" dirty="0">
+              <a:latin typeface="Times New Roman" panose="02020603050405020304" pitchFamily="18" charset="0"/>
+              <a:cs typeface="Times New Roman" panose="02020603050405020304" pitchFamily="18" charset="0"/>
+            </a:endParaRPr>
+          </a:p>
+        </p:txBody>
+      </p:sp>
+      <p:pic>
+        <p:nvPicPr>
+          <p:cNvPr id="3" name="Image 0" descr="preencoded.png"/>
+          <p:cNvPicPr>
+            <a:picLocks noChangeAspect="1"/>
+          </p:cNvPicPr>
+          <p:nvPr/>
+        </p:nvPicPr>
+        <p:blipFill>
+          <a:blip r:embed="rId3"/>
+          <a:stretch>
+            <a:fillRect/>
+          </a:stretch>
+        </p:blipFill>
+        <p:spPr>
+          <a:xfrm>
+            <a:off x="745569" y="1885236"/>
+            <a:ext cx="532448" cy="532448"/>
+          </a:xfrm>
+          <a:prstGeom prst="rect">
+            <a:avLst/>
+          </a:prstGeom>
+        </p:spPr>
+      </p:pic>
+      <p:sp>
+        <p:nvSpPr>
+          <p:cNvPr id="4" name="Text 1"/>
+          <p:cNvSpPr/>
+          <p:nvPr/>
+        </p:nvSpPr>
+        <p:spPr>
+          <a:xfrm>
+            <a:off x="1491020" y="1847969"/>
+            <a:ext cx="2662714" cy="332780"/>
+          </a:xfrm>
+          <a:prstGeom prst="rect">
+            <a:avLst/>
+          </a:prstGeom>
+          <a:noFill/>
+          <a:ln/>
+        </p:spPr>
+        <p:txBody>
+          <a:bodyPr wrap="none" lIns="0" tIns="0" rIns="0" bIns="0" rtlCol="0" anchor="t"/>
+          <a:lstStyle/>
+          <a:p>
+            <a:pPr marL="0" indent="0" algn="l">
+              <a:lnSpc>
+                <a:spcPts val="2600"/>
+              </a:lnSpc>
+              <a:buNone/>
+            </a:pPr>
+            <a:r>
+              <a:rPr lang="en-US" sz="2050" b="1" dirty="0">
+                <a:solidFill>
+                  <a:srgbClr val="3B4E4E"/>
+                </a:solidFill>
+                <a:latin typeface="Times New Roman" panose="02020603050405020304" pitchFamily="18" charset="0"/>
+                <a:ea typeface="Syne Bold" pitchFamily="34" charset="-122"/>
+                <a:cs typeface="Times New Roman" panose="02020603050405020304" pitchFamily="18" charset="0"/>
+              </a:rPr>
+              <a:t>Separación</a:t>
+            </a:r>
+            <a:endParaRPr lang="en-US" sz="2050" dirty="0">
+              <a:latin typeface="Times New Roman" panose="02020603050405020304" pitchFamily="18" charset="0"/>
+              <a:cs typeface="Times New Roman" panose="02020603050405020304" pitchFamily="18" charset="0"/>
+            </a:endParaRPr>
+          </a:p>
+        </p:txBody>
+      </p:sp>
+      <p:sp>
+        <p:nvSpPr>
+          <p:cNvPr id="5" name="Text 2"/>
+          <p:cNvSpPr/>
+          <p:nvPr/>
+        </p:nvSpPr>
+        <p:spPr>
+          <a:xfrm>
+            <a:off x="1491020" y="2308503"/>
+            <a:ext cx="12393811" cy="340757"/>
+          </a:xfrm>
+          <a:prstGeom prst="rect">
+            <a:avLst/>
+          </a:prstGeom>
+          <a:noFill/>
+          <a:ln/>
+        </p:spPr>
+        <p:txBody>
+          <a:bodyPr wrap="none" lIns="0" tIns="0" rIns="0" bIns="0" rtlCol="0" anchor="t"/>
+          <a:lstStyle/>
+          <a:p>
+            <a:pPr marL="0" indent="0" algn="l">
+              <a:lnSpc>
+                <a:spcPts val="2650"/>
+              </a:lnSpc>
+              <a:buNone/>
+            </a:pPr>
+            <a:r>
+              <a:rPr lang="en-US" sz="1650" dirty="0">
+                <a:solidFill>
+                  <a:srgbClr val="3B4E4E"/>
+                </a:solidFill>
+                <a:latin typeface="Times New Roman" panose="02020603050405020304" pitchFamily="18" charset="0"/>
+                <a:ea typeface="Overpass Light" pitchFamily="34" charset="-122"/>
+                <a:cs typeface="Times New Roman" panose="02020603050405020304" pitchFamily="18" charset="0"/>
+              </a:rPr>
+              <a:t>El modelo MVC separa las </a:t>
+            </a:r>
+            <a:r>
+              <a:rPr lang="en-US" sz="1650" dirty="0" err="1">
+                <a:solidFill>
+                  <a:srgbClr val="3B4E4E"/>
+                </a:solidFill>
+                <a:latin typeface="Times New Roman" panose="02020603050405020304" pitchFamily="18" charset="0"/>
+                <a:ea typeface="Overpass Light" pitchFamily="34" charset="-122"/>
+                <a:cs typeface="Times New Roman" panose="02020603050405020304" pitchFamily="18" charset="0"/>
+              </a:rPr>
+              <a:t>responsabilidades</a:t>
+            </a:r>
+            <a:r>
+              <a:rPr lang="en-US" sz="1650" dirty="0">
+                <a:solidFill>
+                  <a:srgbClr val="3B4E4E"/>
+                </a:solidFill>
+                <a:latin typeface="Times New Roman" panose="02020603050405020304" pitchFamily="18" charset="0"/>
+                <a:ea typeface="Overpass Light" pitchFamily="34" charset="-122"/>
+                <a:cs typeface="Times New Roman" panose="02020603050405020304" pitchFamily="18" charset="0"/>
+              </a:rPr>
+              <a:t>, lo que facilita el desarrollo, la prueba y el mantenimiento del código.</a:t>
+            </a:r>
+            <a:endParaRPr lang="en-US" sz="1650" dirty="0">
+              <a:latin typeface="Times New Roman" panose="02020603050405020304" pitchFamily="18" charset="0"/>
+              <a:cs typeface="Times New Roman" panose="02020603050405020304" pitchFamily="18" charset="0"/>
+            </a:endParaRPr>
+          </a:p>
+        </p:txBody>
+      </p:sp>
+      <p:pic>
+        <p:nvPicPr>
+          <p:cNvPr id="6" name="Image 1" descr="preencoded.png"/>
+          <p:cNvPicPr>
+            <a:picLocks noChangeAspect="1"/>
+          </p:cNvPicPr>
+          <p:nvPr/>
+        </p:nvPicPr>
+        <p:blipFill>
+          <a:blip r:embed="rId4"/>
+          <a:stretch>
+            <a:fillRect/>
+          </a:stretch>
+        </p:blipFill>
+        <p:spPr>
+          <a:xfrm>
+            <a:off x="745569" y="3325535"/>
+            <a:ext cx="532448" cy="532448"/>
+          </a:xfrm>
+          <a:prstGeom prst="rect">
+            <a:avLst/>
+          </a:prstGeom>
+        </p:spPr>
+      </p:pic>
+      <p:sp>
+        <p:nvSpPr>
+          <p:cNvPr id="7" name="Text 3"/>
+          <p:cNvSpPr/>
+          <p:nvPr/>
+        </p:nvSpPr>
+        <p:spPr>
+          <a:xfrm>
+            <a:off x="1491020" y="3288268"/>
+            <a:ext cx="2662714" cy="332780"/>
+          </a:xfrm>
+          <a:prstGeom prst="rect">
+            <a:avLst/>
+          </a:prstGeom>
+          <a:noFill/>
+          <a:ln/>
+        </p:spPr>
+        <p:txBody>
+          <a:bodyPr wrap="none" lIns="0" tIns="0" rIns="0" bIns="0" rtlCol="0" anchor="t"/>
+          <a:lstStyle/>
+          <a:p>
+            <a:pPr marL="0" indent="0" algn="l">
+              <a:lnSpc>
+                <a:spcPts val="2600"/>
+              </a:lnSpc>
+              <a:buNone/>
+            </a:pPr>
+            <a:r>
+              <a:rPr lang="en-US" sz="2050" b="1" dirty="0">
+                <a:solidFill>
+                  <a:srgbClr val="3B4E4E"/>
+                </a:solidFill>
+                <a:latin typeface="Times New Roman" panose="02020603050405020304" pitchFamily="18" charset="0"/>
+                <a:ea typeface="Syne Bold" pitchFamily="34" charset="-122"/>
+                <a:cs typeface="Times New Roman" panose="02020603050405020304" pitchFamily="18" charset="0"/>
+              </a:rPr>
+              <a:t>Reutilización</a:t>
+            </a:r>
+            <a:endParaRPr lang="en-US" sz="2050" dirty="0">
+              <a:latin typeface="Times New Roman" panose="02020603050405020304" pitchFamily="18" charset="0"/>
+              <a:cs typeface="Times New Roman" panose="02020603050405020304" pitchFamily="18" charset="0"/>
+            </a:endParaRPr>
+          </a:p>
+        </p:txBody>
+      </p:sp>
+      <p:sp>
+        <p:nvSpPr>
+          <p:cNvPr id="8" name="Text 4"/>
+          <p:cNvSpPr/>
+          <p:nvPr/>
+        </p:nvSpPr>
+        <p:spPr>
+          <a:xfrm>
+            <a:off x="1491020" y="3748802"/>
+            <a:ext cx="12393811" cy="340757"/>
+          </a:xfrm>
+          <a:prstGeom prst="rect">
+            <a:avLst/>
+          </a:prstGeom>
+          <a:noFill/>
+          <a:ln/>
+        </p:spPr>
+        <p:txBody>
+          <a:bodyPr wrap="none" lIns="0" tIns="0" rIns="0" bIns="0" rtlCol="0" anchor="t"/>
+          <a:lstStyle/>
+          <a:p>
+            <a:pPr marL="0" indent="0" algn="l">
+              <a:lnSpc>
+                <a:spcPts val="2650"/>
+              </a:lnSpc>
+              <a:buNone/>
+            </a:pPr>
+            <a:r>
+              <a:rPr lang="en-US" sz="1650" dirty="0">
+                <a:solidFill>
+                  <a:srgbClr val="3B4E4E"/>
+                </a:solidFill>
+                <a:latin typeface="Times New Roman" panose="02020603050405020304" pitchFamily="18" charset="0"/>
+                <a:ea typeface="Overpass Light" pitchFamily="34" charset="-122"/>
+                <a:cs typeface="Times New Roman" panose="02020603050405020304" pitchFamily="18" charset="0"/>
+              </a:rPr>
+              <a:t>Los componentes MVC se pueden reutilizar en diferentes partes de la aplicación, reduciendo la duplicación de código.</a:t>
+            </a:r>
+            <a:endParaRPr lang="en-US" sz="1650" dirty="0">
+              <a:latin typeface="Times New Roman" panose="02020603050405020304" pitchFamily="18" charset="0"/>
+              <a:cs typeface="Times New Roman" panose="02020603050405020304" pitchFamily="18" charset="0"/>
+            </a:endParaRPr>
+          </a:p>
+        </p:txBody>
+      </p:sp>
+      <p:pic>
+        <p:nvPicPr>
+          <p:cNvPr id="9" name="Image 2" descr="preencoded.png"/>
+          <p:cNvPicPr>
+            <a:picLocks noChangeAspect="1"/>
+          </p:cNvPicPr>
+          <p:nvPr/>
+        </p:nvPicPr>
+        <p:blipFill>
+          <a:blip r:embed="rId5"/>
+          <a:stretch>
+            <a:fillRect/>
+          </a:stretch>
+        </p:blipFill>
+        <p:spPr>
+          <a:xfrm>
+            <a:off x="745569" y="4765834"/>
+            <a:ext cx="532448" cy="532448"/>
+          </a:xfrm>
+          <a:prstGeom prst="rect">
+            <a:avLst/>
+          </a:prstGeom>
+        </p:spPr>
+      </p:pic>
+      <p:sp>
+        <p:nvSpPr>
+          <p:cNvPr id="10" name="Text 5"/>
+          <p:cNvSpPr/>
+          <p:nvPr/>
+        </p:nvSpPr>
+        <p:spPr>
+          <a:xfrm>
+            <a:off x="1491020" y="4728567"/>
+            <a:ext cx="2662714" cy="332780"/>
+          </a:xfrm>
+          <a:prstGeom prst="rect">
+            <a:avLst/>
+          </a:prstGeom>
+          <a:noFill/>
+          <a:ln/>
+        </p:spPr>
+        <p:txBody>
+          <a:bodyPr wrap="none" lIns="0" tIns="0" rIns="0" bIns="0" rtlCol="0" anchor="t"/>
+          <a:lstStyle/>
+          <a:p>
+            <a:pPr marL="0" indent="0" algn="l">
+              <a:lnSpc>
+                <a:spcPts val="2600"/>
+              </a:lnSpc>
+              <a:buNone/>
+            </a:pPr>
+            <a:r>
+              <a:rPr lang="en-US" sz="2050" b="1" dirty="0">
+                <a:solidFill>
+                  <a:srgbClr val="3B4E4E"/>
+                </a:solidFill>
+                <a:latin typeface="Times New Roman" panose="02020603050405020304" pitchFamily="18" charset="0"/>
+                <a:ea typeface="Syne Bold" pitchFamily="34" charset="-122"/>
+                <a:cs typeface="Times New Roman" panose="02020603050405020304" pitchFamily="18" charset="0"/>
+              </a:rPr>
+              <a:t>Escalabilidad</a:t>
+            </a:r>
+            <a:endParaRPr lang="en-US" sz="2050" dirty="0">
+              <a:latin typeface="Times New Roman" panose="02020603050405020304" pitchFamily="18" charset="0"/>
+              <a:cs typeface="Times New Roman" panose="02020603050405020304" pitchFamily="18" charset="0"/>
+            </a:endParaRPr>
+          </a:p>
+        </p:txBody>
+      </p:sp>
+      <p:sp>
+        <p:nvSpPr>
+          <p:cNvPr id="11" name="Text 6"/>
+          <p:cNvSpPr/>
+          <p:nvPr/>
+        </p:nvSpPr>
+        <p:spPr>
+          <a:xfrm>
+            <a:off x="1491020" y="5189101"/>
+            <a:ext cx="12393811" cy="681514"/>
+          </a:xfrm>
+          <a:prstGeom prst="rect">
+            <a:avLst/>
+          </a:prstGeom>
+          <a:noFill/>
+          <a:ln/>
+        </p:spPr>
+        <p:txBody>
+          <a:bodyPr wrap="square" lIns="0" tIns="0" rIns="0" bIns="0" rtlCol="0" anchor="t"/>
+          <a:lstStyle/>
+          <a:p>
+            <a:pPr marL="0" indent="0" algn="l">
+              <a:lnSpc>
+                <a:spcPts val="2650"/>
+              </a:lnSpc>
+              <a:buNone/>
+            </a:pPr>
+            <a:r>
+              <a:rPr lang="en-US" sz="1650" dirty="0">
+                <a:solidFill>
+                  <a:srgbClr val="3B4E4E"/>
+                </a:solidFill>
+                <a:latin typeface="Times New Roman" panose="02020603050405020304" pitchFamily="18" charset="0"/>
+                <a:ea typeface="Overpass Light" pitchFamily="34" charset="-122"/>
+                <a:cs typeface="Times New Roman" panose="02020603050405020304" pitchFamily="18" charset="0"/>
+              </a:rPr>
+              <a:t>El enfoque modular de MVC facilita la escalabilidad de la aplicación, ya que los componentes se pueden desarrollar y desplegar de forma independiente.</a:t>
+            </a:r>
+            <a:endParaRPr lang="en-US" sz="1650" dirty="0">
               <a:latin typeface="Times New Roman" panose="02020603050405020304" pitchFamily="18" charset="0"/>
               <a:cs typeface="Times New Roman" panose="02020603050405020304" pitchFamily="18" charset="0"/>
             </a:endParaRPr>
@@ -10512,7 +11026,7 @@
 
 <file path=ppt/slides/slide9.xml><?xml version="1.0" encoding="utf-8"?>
 <p:sld xmlns:a="http://schemas.openxmlformats.org/drawingml/2006/main" xmlns:r="http://schemas.openxmlformats.org/officeDocument/2006/relationships" xmlns:p="http://schemas.openxmlformats.org/presentationml/2006/main">
-  <p:cSld name="Slide 7">
+  <p:cSld>
     <p:spTree>
       <p:nvGrpSpPr>
         <p:cNvPr id="1" name=""/>
@@ -10529,356 +11043,20 @@
       </p:grpSpPr>
       <p:sp>
         <p:nvSpPr>
-          <p:cNvPr id="2" name="Text 0"/>
+          <p:cNvPr id="2" name="Text 0">
+            <a:extLst>
+              <a:ext uri="{FF2B5EF4-FFF2-40B4-BE49-F238E27FC236}">
+                <a16:creationId xmlns:a16="http://schemas.microsoft.com/office/drawing/2014/main" id="{2FF6A837-8A35-4402-9FF3-8FC6EA0AFC0C}"/>
+              </a:ext>
+            </a:extLst>
+          </p:cNvPr>
           <p:cNvSpPr/>
           <p:nvPr/>
         </p:nvSpPr>
         <p:spPr>
           <a:xfrm>
-            <a:off x="745569" y="756285"/>
-            <a:ext cx="11277243" cy="665678"/>
-          </a:xfrm>
-          <a:prstGeom prst="rect">
-            <a:avLst/>
-          </a:prstGeom>
-          <a:noFill/>
-          <a:ln/>
-        </p:spPr>
-        <p:txBody>
-          <a:bodyPr wrap="none" lIns="0" tIns="0" rIns="0" bIns="0" rtlCol="0" anchor="t"/>
-          <a:lstStyle/>
-          <a:p>
-            <a:pPr marL="0" indent="0" algn="l">
-              <a:lnSpc>
-                <a:spcPts val="5200"/>
-              </a:lnSpc>
-              <a:buNone/>
-            </a:pPr>
-            <a:r>
-              <a:rPr lang="en-US" sz="4150" b="1" dirty="0">
-                <a:solidFill>
-                  <a:srgbClr val="233939"/>
-                </a:solidFill>
-                <a:latin typeface="Times New Roman" panose="02020603050405020304" pitchFamily="18" charset="0"/>
-                <a:ea typeface="Syne Bold" pitchFamily="34" charset="-122"/>
-                <a:cs typeface="Times New Roman" panose="02020603050405020304" pitchFamily="18" charset="0"/>
-              </a:rPr>
-              <a:t>Ventajas del Enfoque Modular de MVC</a:t>
-            </a:r>
-            <a:endParaRPr lang="en-US" sz="4150" dirty="0">
-              <a:latin typeface="Times New Roman" panose="02020603050405020304" pitchFamily="18" charset="0"/>
-              <a:cs typeface="Times New Roman" panose="02020603050405020304" pitchFamily="18" charset="0"/>
-            </a:endParaRPr>
-          </a:p>
-        </p:txBody>
-      </p:sp>
-      <p:pic>
-        <p:nvPicPr>
-          <p:cNvPr id="3" name="Image 0" descr="preencoded.png"/>
-          <p:cNvPicPr>
-            <a:picLocks noChangeAspect="1"/>
-          </p:cNvPicPr>
-          <p:nvPr/>
-        </p:nvPicPr>
-        <p:blipFill>
-          <a:blip r:embed="rId3"/>
-          <a:stretch>
-            <a:fillRect/>
-          </a:stretch>
-        </p:blipFill>
-        <p:spPr>
-          <a:xfrm>
-            <a:off x="745569" y="1885236"/>
-            <a:ext cx="532448" cy="532448"/>
-          </a:xfrm>
-          <a:prstGeom prst="rect">
-            <a:avLst/>
-          </a:prstGeom>
-        </p:spPr>
-      </p:pic>
-      <p:sp>
-        <p:nvSpPr>
-          <p:cNvPr id="4" name="Text 1"/>
-          <p:cNvSpPr/>
-          <p:nvPr/>
-        </p:nvSpPr>
-        <p:spPr>
-          <a:xfrm>
-            <a:off x="1491020" y="1847969"/>
-            <a:ext cx="2662714" cy="332780"/>
-          </a:xfrm>
-          <a:prstGeom prst="rect">
-            <a:avLst/>
-          </a:prstGeom>
-          <a:noFill/>
-          <a:ln/>
-        </p:spPr>
-        <p:txBody>
-          <a:bodyPr wrap="none" lIns="0" tIns="0" rIns="0" bIns="0" rtlCol="0" anchor="t"/>
-          <a:lstStyle/>
-          <a:p>
-            <a:pPr marL="0" indent="0" algn="l">
-              <a:lnSpc>
-                <a:spcPts val="2600"/>
-              </a:lnSpc>
-              <a:buNone/>
-            </a:pPr>
-            <a:r>
-              <a:rPr lang="en-US" sz="2050" b="1" dirty="0">
-                <a:solidFill>
-                  <a:srgbClr val="3B4E4E"/>
-                </a:solidFill>
-                <a:latin typeface="Times New Roman" panose="02020603050405020304" pitchFamily="18" charset="0"/>
-                <a:ea typeface="Syne Bold" pitchFamily="34" charset="-122"/>
-                <a:cs typeface="Times New Roman" panose="02020603050405020304" pitchFamily="18" charset="0"/>
-              </a:rPr>
-              <a:t>Separación</a:t>
-            </a:r>
-            <a:endParaRPr lang="en-US" sz="2050" dirty="0">
-              <a:latin typeface="Times New Roman" panose="02020603050405020304" pitchFamily="18" charset="0"/>
-              <a:cs typeface="Times New Roman" panose="02020603050405020304" pitchFamily="18" charset="0"/>
-            </a:endParaRPr>
-          </a:p>
-        </p:txBody>
-      </p:sp>
-      <p:sp>
-        <p:nvSpPr>
-          <p:cNvPr id="5" name="Text 2"/>
-          <p:cNvSpPr/>
-          <p:nvPr/>
-        </p:nvSpPr>
-        <p:spPr>
-          <a:xfrm>
-            <a:off x="1491020" y="2308503"/>
-            <a:ext cx="12393811" cy="340757"/>
-          </a:xfrm>
-          <a:prstGeom prst="rect">
-            <a:avLst/>
-          </a:prstGeom>
-          <a:noFill/>
-          <a:ln/>
-        </p:spPr>
-        <p:txBody>
-          <a:bodyPr wrap="none" lIns="0" tIns="0" rIns="0" bIns="0" rtlCol="0" anchor="t"/>
-          <a:lstStyle/>
-          <a:p>
-            <a:pPr marL="0" indent="0" algn="l">
-              <a:lnSpc>
-                <a:spcPts val="2650"/>
-              </a:lnSpc>
-              <a:buNone/>
-            </a:pPr>
-            <a:r>
-              <a:rPr lang="en-US" sz="1650" dirty="0">
-                <a:solidFill>
-                  <a:srgbClr val="3B4E4E"/>
-                </a:solidFill>
-                <a:latin typeface="Times New Roman" panose="02020603050405020304" pitchFamily="18" charset="0"/>
-                <a:ea typeface="Overpass Light" pitchFamily="34" charset="-122"/>
-                <a:cs typeface="Times New Roman" panose="02020603050405020304" pitchFamily="18" charset="0"/>
-              </a:rPr>
-              <a:t>El modelo MVC separa las preocupaciones, lo que facilita el desarrollo, la prueba y el mantenimiento del código.</a:t>
-            </a:r>
-            <a:endParaRPr lang="en-US" sz="1650" dirty="0">
-              <a:latin typeface="Times New Roman" panose="02020603050405020304" pitchFamily="18" charset="0"/>
-              <a:cs typeface="Times New Roman" panose="02020603050405020304" pitchFamily="18" charset="0"/>
-            </a:endParaRPr>
-          </a:p>
-        </p:txBody>
-      </p:sp>
-      <p:pic>
-        <p:nvPicPr>
-          <p:cNvPr id="6" name="Image 1" descr="preencoded.png"/>
-          <p:cNvPicPr>
-            <a:picLocks noChangeAspect="1"/>
-          </p:cNvPicPr>
-          <p:nvPr/>
-        </p:nvPicPr>
-        <p:blipFill>
-          <a:blip r:embed="rId4"/>
-          <a:stretch>
-            <a:fillRect/>
-          </a:stretch>
-        </p:blipFill>
-        <p:spPr>
-          <a:xfrm>
-            <a:off x="745569" y="3325535"/>
-            <a:ext cx="532448" cy="532448"/>
-          </a:xfrm>
-          <a:prstGeom prst="rect">
-            <a:avLst/>
-          </a:prstGeom>
-        </p:spPr>
-      </p:pic>
-      <p:sp>
-        <p:nvSpPr>
-          <p:cNvPr id="7" name="Text 3"/>
-          <p:cNvSpPr/>
-          <p:nvPr/>
-        </p:nvSpPr>
-        <p:spPr>
-          <a:xfrm>
-            <a:off x="1491020" y="3288268"/>
-            <a:ext cx="2662714" cy="332780"/>
-          </a:xfrm>
-          <a:prstGeom prst="rect">
-            <a:avLst/>
-          </a:prstGeom>
-          <a:noFill/>
-          <a:ln/>
-        </p:spPr>
-        <p:txBody>
-          <a:bodyPr wrap="none" lIns="0" tIns="0" rIns="0" bIns="0" rtlCol="0" anchor="t"/>
-          <a:lstStyle/>
-          <a:p>
-            <a:pPr marL="0" indent="0" algn="l">
-              <a:lnSpc>
-                <a:spcPts val="2600"/>
-              </a:lnSpc>
-              <a:buNone/>
-            </a:pPr>
-            <a:r>
-              <a:rPr lang="en-US" sz="2050" b="1" dirty="0">
-                <a:solidFill>
-                  <a:srgbClr val="3B4E4E"/>
-                </a:solidFill>
-                <a:latin typeface="Times New Roman" panose="02020603050405020304" pitchFamily="18" charset="0"/>
-                <a:ea typeface="Syne Bold" pitchFamily="34" charset="-122"/>
-                <a:cs typeface="Times New Roman" panose="02020603050405020304" pitchFamily="18" charset="0"/>
-              </a:rPr>
-              <a:t>Reutilización</a:t>
-            </a:r>
-            <a:endParaRPr lang="en-US" sz="2050" dirty="0">
-              <a:latin typeface="Times New Roman" panose="02020603050405020304" pitchFamily="18" charset="0"/>
-              <a:cs typeface="Times New Roman" panose="02020603050405020304" pitchFamily="18" charset="0"/>
-            </a:endParaRPr>
-          </a:p>
-        </p:txBody>
-      </p:sp>
-      <p:sp>
-        <p:nvSpPr>
-          <p:cNvPr id="8" name="Text 4"/>
-          <p:cNvSpPr/>
-          <p:nvPr/>
-        </p:nvSpPr>
-        <p:spPr>
-          <a:xfrm>
-            <a:off x="1491020" y="3748802"/>
-            <a:ext cx="12393811" cy="340757"/>
-          </a:xfrm>
-          <a:prstGeom prst="rect">
-            <a:avLst/>
-          </a:prstGeom>
-          <a:noFill/>
-          <a:ln/>
-        </p:spPr>
-        <p:txBody>
-          <a:bodyPr wrap="none" lIns="0" tIns="0" rIns="0" bIns="0" rtlCol="0" anchor="t"/>
-          <a:lstStyle/>
-          <a:p>
-            <a:pPr marL="0" indent="0" algn="l">
-              <a:lnSpc>
-                <a:spcPts val="2650"/>
-              </a:lnSpc>
-              <a:buNone/>
-            </a:pPr>
-            <a:r>
-              <a:rPr lang="en-US" sz="1650" dirty="0">
-                <a:solidFill>
-                  <a:srgbClr val="3B4E4E"/>
-                </a:solidFill>
-                <a:latin typeface="Times New Roman" panose="02020603050405020304" pitchFamily="18" charset="0"/>
-                <a:ea typeface="Overpass Light" pitchFamily="34" charset="-122"/>
-                <a:cs typeface="Times New Roman" panose="02020603050405020304" pitchFamily="18" charset="0"/>
-              </a:rPr>
-              <a:t>Los componentes MVC se pueden reutilizar en diferentes partes de la aplicación, reduciendo la duplicación de código.</a:t>
-            </a:r>
-            <a:endParaRPr lang="en-US" sz="1650" dirty="0">
-              <a:latin typeface="Times New Roman" panose="02020603050405020304" pitchFamily="18" charset="0"/>
-              <a:cs typeface="Times New Roman" panose="02020603050405020304" pitchFamily="18" charset="0"/>
-            </a:endParaRPr>
-          </a:p>
-        </p:txBody>
-      </p:sp>
-      <p:pic>
-        <p:nvPicPr>
-          <p:cNvPr id="9" name="Image 2" descr="preencoded.png"/>
-          <p:cNvPicPr>
-            <a:picLocks noChangeAspect="1"/>
-          </p:cNvPicPr>
-          <p:nvPr/>
-        </p:nvPicPr>
-        <p:blipFill>
-          <a:blip r:embed="rId5"/>
-          <a:stretch>
-            <a:fillRect/>
-          </a:stretch>
-        </p:blipFill>
-        <p:spPr>
-          <a:xfrm>
-            <a:off x="745569" y="4765834"/>
-            <a:ext cx="532448" cy="532448"/>
-          </a:xfrm>
-          <a:prstGeom prst="rect">
-            <a:avLst/>
-          </a:prstGeom>
-        </p:spPr>
-      </p:pic>
-      <p:sp>
-        <p:nvSpPr>
-          <p:cNvPr id="10" name="Text 5"/>
-          <p:cNvSpPr/>
-          <p:nvPr/>
-        </p:nvSpPr>
-        <p:spPr>
-          <a:xfrm>
-            <a:off x="1491020" y="4728567"/>
-            <a:ext cx="2662714" cy="332780"/>
-          </a:xfrm>
-          <a:prstGeom prst="rect">
-            <a:avLst/>
-          </a:prstGeom>
-          <a:noFill/>
-          <a:ln/>
-        </p:spPr>
-        <p:txBody>
-          <a:bodyPr wrap="none" lIns="0" tIns="0" rIns="0" bIns="0" rtlCol="0" anchor="t"/>
-          <a:lstStyle/>
-          <a:p>
-            <a:pPr marL="0" indent="0" algn="l">
-              <a:lnSpc>
-                <a:spcPts val="2600"/>
-              </a:lnSpc>
-              <a:buNone/>
-            </a:pPr>
-            <a:r>
-              <a:rPr lang="en-US" sz="2050" b="1" dirty="0">
-                <a:solidFill>
-                  <a:srgbClr val="3B4E4E"/>
-                </a:solidFill>
-                <a:latin typeface="Times New Roman" panose="02020603050405020304" pitchFamily="18" charset="0"/>
-                <a:ea typeface="Syne Bold" pitchFamily="34" charset="-122"/>
-                <a:cs typeface="Times New Roman" panose="02020603050405020304" pitchFamily="18" charset="0"/>
-              </a:rPr>
-              <a:t>Escalabilidad</a:t>
-            </a:r>
-            <a:endParaRPr lang="en-US" sz="2050" dirty="0">
-              <a:latin typeface="Times New Roman" panose="02020603050405020304" pitchFamily="18" charset="0"/>
-              <a:cs typeface="Times New Roman" panose="02020603050405020304" pitchFamily="18" charset="0"/>
-            </a:endParaRPr>
-          </a:p>
-        </p:txBody>
-      </p:sp>
-      <p:sp>
-        <p:nvSpPr>
-          <p:cNvPr id="11" name="Text 6"/>
-          <p:cNvSpPr/>
-          <p:nvPr/>
-        </p:nvSpPr>
-        <p:spPr>
-          <a:xfrm>
-            <a:off x="1491020" y="5189101"/>
-            <a:ext cx="12393811" cy="681514"/>
+            <a:off x="715089" y="884634"/>
+            <a:ext cx="9985862" cy="1276826"/>
           </a:xfrm>
           <a:prstGeom prst="rect">
             <a:avLst/>
@@ -10892,22 +11070,44 @@
           <a:p>
             <a:pPr marL="0" indent="0" algn="l">
               <a:lnSpc>
-                <a:spcPts val="2650"/>
+                <a:spcPts val="5000"/>
               </a:lnSpc>
               <a:buNone/>
             </a:pPr>
             <a:r>
-              <a:rPr lang="en-US" sz="1650" dirty="0">
+              <a:rPr lang="en-US" sz="4000" b="1" dirty="0" err="1">
                 <a:solidFill>
-                  <a:srgbClr val="3B4E4E"/>
+                  <a:srgbClr val="233939"/>
                 </a:solidFill>
                 <a:latin typeface="Times New Roman" panose="02020603050405020304" pitchFamily="18" charset="0"/>
-                <a:ea typeface="Overpass Light" pitchFamily="34" charset="-122"/>
+                <a:ea typeface="Syne Bold" pitchFamily="34" charset="-122"/>
                 <a:cs typeface="Times New Roman" panose="02020603050405020304" pitchFamily="18" charset="0"/>
               </a:rPr>
-              <a:t>El enfoque modular de MVC facilita la escalabilidad de la aplicación, ya que los componentes se pueden desarrollar y desplegar de forma independiente.</a:t>
+              <a:t>Controlador</a:t>
             </a:r>
-            <a:endParaRPr lang="en-US" sz="1650" dirty="0">
+            <a:r>
+              <a:rPr lang="en-US" sz="4000" b="1" dirty="0">
+                <a:solidFill>
+                  <a:srgbClr val="233939"/>
+                </a:solidFill>
+                <a:latin typeface="Times New Roman" panose="02020603050405020304" pitchFamily="18" charset="0"/>
+                <a:ea typeface="Syne Bold" pitchFamily="34" charset="-122"/>
+                <a:cs typeface="Times New Roman" panose="02020603050405020304" pitchFamily="18" charset="0"/>
+              </a:rPr>
+              <a:t> </a:t>
+            </a:r>
+            <a:r>
+              <a:rPr lang="en-US" sz="4000" b="1" dirty="0" err="1">
+                <a:solidFill>
+                  <a:srgbClr val="233939"/>
+                </a:solidFill>
+                <a:latin typeface="Times New Roman" panose="02020603050405020304" pitchFamily="18" charset="0"/>
+                <a:ea typeface="Syne Bold" pitchFamily="34" charset="-122"/>
+                <a:cs typeface="Times New Roman" panose="02020603050405020304" pitchFamily="18" charset="0"/>
+              </a:rPr>
+              <a:t>ViewBag</a:t>
+            </a:r>
+            <a:endParaRPr lang="en-US" sz="4000" dirty="0">
               <a:latin typeface="Times New Roman" panose="02020603050405020304" pitchFamily="18" charset="0"/>
               <a:cs typeface="Times New Roman" panose="02020603050405020304" pitchFamily="18" charset="0"/>
             </a:endParaRPr>
@@ -10916,43 +11116,183 @@
       </p:sp>
       <p:sp>
         <p:nvSpPr>
-          <p:cNvPr id="12" name="Text 7"/>
-          <p:cNvSpPr/>
+          <p:cNvPr id="4" name="CuadroTexto 3">
+            <a:extLst>
+              <a:ext uri="{FF2B5EF4-FFF2-40B4-BE49-F238E27FC236}">
+                <a16:creationId xmlns:a16="http://schemas.microsoft.com/office/drawing/2014/main" id="{B297E61B-B5B7-4612-A19D-FBE47BD9A202}"/>
+              </a:ext>
+            </a:extLst>
+          </p:cNvPr>
+          <p:cNvSpPr txBox="1"/>
           <p:nvPr/>
         </p:nvSpPr>
         <p:spPr>
           <a:xfrm>
-            <a:off x="745569" y="6110168"/>
-            <a:ext cx="13139261" cy="1363028"/>
+            <a:off x="715089" y="2308825"/>
+            <a:ext cx="13309830" cy="5324535"/>
           </a:xfrm>
           <a:prstGeom prst="rect">
             <a:avLst/>
           </a:prstGeom>
           <a:noFill/>
-          <a:ln/>
         </p:spPr>
         <p:txBody>
-          <a:bodyPr wrap="square" lIns="0" tIns="0" rIns="0" bIns="0" rtlCol="0" anchor="t"/>
+          <a:bodyPr wrap="square">
+            <a:spAutoFit/>
+          </a:bodyPr>
           <a:lstStyle/>
           <a:p>
-            <a:pPr marL="0" indent="0" algn="l">
-              <a:lnSpc>
-                <a:spcPts val="2650"/>
-              </a:lnSpc>
-              <a:buNone/>
+            <a:r>
+              <a:rPr lang="es-ES" sz="2400" dirty="0">
+                <a:latin typeface="Times New Roman" panose="02020603050405020304" pitchFamily="18" charset="0"/>
+                <a:cs typeface="Times New Roman" panose="02020603050405020304" pitchFamily="18" charset="0"/>
+              </a:rPr>
+              <a:t>En ASP.NET Core es una forma dinámica de </a:t>
+            </a:r>
+            <a:r>
+              <a:rPr lang="es-ES" sz="2800" b="1" u="sng" dirty="0">
+                <a:latin typeface="Times New Roman" panose="02020603050405020304" pitchFamily="18" charset="0"/>
+                <a:cs typeface="Times New Roman" panose="02020603050405020304" pitchFamily="18" charset="0"/>
+              </a:rPr>
+              <a:t>pasar datos desde el Controlador a la Vista </a:t>
+            </a:r>
+            <a:r>
+              <a:rPr lang="es-ES" sz="2400" dirty="0">
+                <a:latin typeface="Times New Roman" panose="02020603050405020304" pitchFamily="18" charset="0"/>
+                <a:cs typeface="Times New Roman" panose="02020603050405020304" pitchFamily="18" charset="0"/>
+              </a:rPr>
+              <a:t>(</a:t>
+            </a:r>
+            <a:r>
+              <a:rPr lang="es-ES" sz="2400" dirty="0" err="1">
+                <a:latin typeface="Times New Roman" panose="02020603050405020304" pitchFamily="18" charset="0"/>
+                <a:cs typeface="Times New Roman" panose="02020603050405020304" pitchFamily="18" charset="0"/>
+              </a:rPr>
+              <a:t>Razor</a:t>
+            </a:r>
+            <a:r>
+              <a:rPr lang="es-ES" sz="2400" dirty="0">
+                <a:latin typeface="Times New Roman" panose="02020603050405020304" pitchFamily="18" charset="0"/>
+                <a:cs typeface="Times New Roman" panose="02020603050405020304" pitchFamily="18" charset="0"/>
+              </a:rPr>
+              <a:t>). </a:t>
+            </a:r>
+          </a:p>
+          <a:p>
+            <a:endParaRPr lang="es-ES" sz="2400" dirty="0">
+              <a:latin typeface="Times New Roman" panose="02020603050405020304" pitchFamily="18" charset="0"/>
+              <a:cs typeface="Times New Roman" panose="02020603050405020304" pitchFamily="18" charset="0"/>
+            </a:endParaRPr>
+          </a:p>
+          <a:p>
+            <a:r>
+              <a:rPr lang="es-ES" sz="2400" dirty="0">
+                <a:latin typeface="Times New Roman" panose="02020603050405020304" pitchFamily="18" charset="0"/>
+                <a:cs typeface="Times New Roman" panose="02020603050405020304" pitchFamily="18" charset="0"/>
+              </a:rPr>
+              <a:t>Para usarlo  no se necesita declarar tipos ni propiedades explícitas para usarlo, debido a que Es una propiedad del tipo Dynamic.</a:t>
+            </a:r>
+          </a:p>
+          <a:p>
+            <a:endParaRPr lang="es-ES" sz="2400" dirty="0">
+              <a:latin typeface="Times New Roman" panose="02020603050405020304" pitchFamily="18" charset="0"/>
+              <a:cs typeface="Times New Roman" panose="02020603050405020304" pitchFamily="18" charset="0"/>
+            </a:endParaRPr>
+          </a:p>
+          <a:p>
+            <a:r>
+              <a:rPr lang="es-419" sz="2400" dirty="0">
+                <a:latin typeface="Times New Roman" panose="02020603050405020304" pitchFamily="18" charset="0"/>
+                <a:cs typeface="Times New Roman" panose="02020603050405020304" pitchFamily="18" charset="0"/>
+              </a:rPr>
+              <a:t>Recomendado para Datos simples y rápidos, se usa cuando </a:t>
+            </a:r>
+            <a:r>
+              <a:rPr lang="es-ES" sz="2400" dirty="0">
+                <a:latin typeface="Times New Roman" panose="02020603050405020304" pitchFamily="18" charset="0"/>
+                <a:cs typeface="Times New Roman" panose="02020603050405020304" pitchFamily="18" charset="0"/>
+              </a:rPr>
+              <a:t>no se quiere crear un modelo de datos completo para algo muy básico.</a:t>
+            </a:r>
+            <a:endParaRPr lang="es-419" sz="2400" dirty="0">
+              <a:latin typeface="Times New Roman" panose="02020603050405020304" pitchFamily="18" charset="0"/>
+              <a:cs typeface="Times New Roman" panose="02020603050405020304" pitchFamily="18" charset="0"/>
+            </a:endParaRPr>
+          </a:p>
+          <a:p>
+            <a:endParaRPr lang="es-419" sz="2400" dirty="0">
+              <a:latin typeface="Times New Roman" panose="02020603050405020304" pitchFamily="18" charset="0"/>
+              <a:cs typeface="Times New Roman" panose="02020603050405020304" pitchFamily="18" charset="0"/>
+            </a:endParaRPr>
+          </a:p>
+          <a:p>
+            <a:r>
+              <a:rPr lang="es-419" sz="2400" dirty="0">
+                <a:latin typeface="Times New Roman" panose="02020603050405020304" pitchFamily="18" charset="0"/>
+                <a:cs typeface="Times New Roman" panose="02020603050405020304" pitchFamily="18" charset="0"/>
+              </a:rPr>
+              <a:t>Otras formas de pasar datos en una aplicación son: </a:t>
+            </a:r>
+          </a:p>
+          <a:p>
+            <a:endParaRPr lang="es-419" sz="2400" dirty="0">
+              <a:latin typeface="Times New Roman" panose="02020603050405020304" pitchFamily="18" charset="0"/>
+              <a:cs typeface="Times New Roman" panose="02020603050405020304" pitchFamily="18" charset="0"/>
+            </a:endParaRPr>
+          </a:p>
+          <a:p>
+            <a:pPr marL="800100" lvl="1" indent="-342900">
+              <a:buFont typeface="Arial" panose="020B0604020202020204" pitchFamily="34" charset="0"/>
+              <a:buChar char="•"/>
             </a:pPr>
             <a:r>
-              <a:rPr lang="en-US" sz="1650" dirty="0">
-                <a:solidFill>
-                  <a:srgbClr val="3B4E4E"/>
-                </a:solidFill>
+              <a:rPr lang="es-419" sz="2400" dirty="0" err="1">
                 <a:latin typeface="Times New Roman" panose="02020603050405020304" pitchFamily="18" charset="0"/>
-                <a:ea typeface="Overpass Light" pitchFamily="34" charset="-122"/>
                 <a:cs typeface="Times New Roman" panose="02020603050405020304" pitchFamily="18" charset="0"/>
               </a:rPr>
-              <a:t>El patrón MVC promueve la separación de responsabilidades, dividiendo la aplicación en tres componentes distintos: Modelo, Vista y Controlador. Esta separación facilita la mantenibilidad del código, ya que los cambios en un componente no afectan necesariamente a los demás. La reutilización de componentes y la facilidad de prueba son otras ventajas clave de este enfoque. Además, el patrón MVC permite la escalabilidad de proyectos complejos, ya que los componentes se pueden desarrollar y desplegar de forma independiente.</a:t>
+              <a:t>ViewData</a:t>
             </a:r>
-            <a:endParaRPr lang="en-US" sz="1650" dirty="0">
+            <a:endParaRPr lang="es-419" sz="2400" dirty="0">
+              <a:latin typeface="Times New Roman" panose="02020603050405020304" pitchFamily="18" charset="0"/>
+              <a:cs typeface="Times New Roman" panose="02020603050405020304" pitchFamily="18" charset="0"/>
+            </a:endParaRPr>
+          </a:p>
+          <a:p>
+            <a:pPr marL="800100" lvl="1" indent="-342900">
+              <a:buFont typeface="Arial" panose="020B0604020202020204" pitchFamily="34" charset="0"/>
+              <a:buChar char="•"/>
+            </a:pPr>
+            <a:r>
+              <a:rPr lang="es-419" sz="2400" dirty="0" err="1">
+                <a:latin typeface="Times New Roman" panose="02020603050405020304" pitchFamily="18" charset="0"/>
+                <a:cs typeface="Times New Roman" panose="02020603050405020304" pitchFamily="18" charset="0"/>
+              </a:rPr>
+              <a:t>Model</a:t>
+            </a:r>
+            <a:endParaRPr lang="es-419" sz="2400" dirty="0">
+              <a:latin typeface="Times New Roman" panose="02020603050405020304" pitchFamily="18" charset="0"/>
+              <a:cs typeface="Times New Roman" panose="02020603050405020304" pitchFamily="18" charset="0"/>
+            </a:endParaRPr>
+          </a:p>
+          <a:p>
+            <a:pPr marL="800100" lvl="1" indent="-342900">
+              <a:buFont typeface="Arial" panose="020B0604020202020204" pitchFamily="34" charset="0"/>
+              <a:buChar char="•"/>
+            </a:pPr>
+            <a:r>
+              <a:rPr lang="es-419" sz="2400" dirty="0" err="1">
+                <a:latin typeface="Times New Roman" panose="02020603050405020304" pitchFamily="18" charset="0"/>
+                <a:cs typeface="Times New Roman" panose="02020603050405020304" pitchFamily="18" charset="0"/>
+              </a:rPr>
+              <a:t>TempData</a:t>
+            </a:r>
+            <a:endParaRPr lang="es-419" sz="2400" dirty="0">
+              <a:latin typeface="Times New Roman" panose="02020603050405020304" pitchFamily="18" charset="0"/>
+              <a:cs typeface="Times New Roman" panose="02020603050405020304" pitchFamily="18" charset="0"/>
+            </a:endParaRPr>
+          </a:p>
+          <a:p>
+            <a:endParaRPr lang="es-419" sz="2400" dirty="0">
               <a:latin typeface="Times New Roman" panose="02020603050405020304" pitchFamily="18" charset="0"/>
               <a:cs typeface="Times New Roman" panose="02020603050405020304" pitchFamily="18" charset="0"/>
             </a:endParaRPr>
@@ -10960,6 +11300,11 @@
         </p:txBody>
       </p:sp>
     </p:spTree>
+    <p:extLst>
+      <p:ext uri="{BB962C8B-B14F-4D97-AF65-F5344CB8AC3E}">
+        <p14:creationId xmlns:p14="http://schemas.microsoft.com/office/powerpoint/2010/main" val="3976031665"/>
+      </p:ext>
+    </p:extLst>
   </p:cSld>
   <p:clrMapOvr>
     <a:masterClrMapping/>

</xml_diff>